<commit_message>
PSSA Crash Course - Added code location to title slide
</commit_message>
<xml_diff>
--- a/PSSA Custom Rule Crash Course/Thomas Rayner PSSA Custom Rule Crash Course.pptx
+++ b/PSSA Custom Rule Crash Course/Thomas Rayner PSSA Custom Rule Crash Course.pptx
@@ -3635,12 +3635,14 @@
         </p:nvSpPr>
         <p:spPr>
           <a:xfrm>
-            <a:off x="1524000" y="4749552"/>
-            <a:ext cx="9144000" cy="508247"/>
+            <a:off x="1524000" y="4412202"/>
+            <a:ext cx="9144000" cy="1509204"/>
           </a:xfrm>
         </p:spPr>
         <p:txBody>
-          <a:bodyPr/>
+          <a:bodyPr>
+            <a:normAutofit/>
+          </a:bodyPr>
           <a:lstStyle/>
           <a:p>
             <a:r>
@@ -3654,6 +3656,23 @@
             <a:r>
               <a:rPr lang="en-US" dirty="0"/>
               <a:t>	workingsysadmin.com</a:t>
+            </a:r>
+          </a:p>
+          <a:p>
+            <a:endParaRPr lang="en-US" dirty="0"/>
+          </a:p>
+          <a:p>
+            <a:r>
+              <a:rPr lang="en-US" sz="2000" dirty="0"/>
+              <a:t>Download slides and demo scripts: github.com/</a:t>
+            </a:r>
+            <a:r>
+              <a:rPr lang="en-US" sz="2000" dirty="0" err="1"/>
+              <a:t>thmsrynr</a:t>
+            </a:r>
+            <a:r>
+              <a:rPr lang="en-US" sz="2000" dirty="0"/>
+              <a:t>/presentation-files</a:t>
             </a:r>
           </a:p>
         </p:txBody>
@@ -5826,13 +5845,13 @@
         </p:nvSpPr>
         <p:spPr>
           <a:xfrm>
-            <a:off x="506027" y="3789734"/>
-            <a:ext cx="11194741" cy="2815252"/>
+            <a:off x="506027" y="2858610"/>
+            <a:ext cx="11194741" cy="3746376"/>
           </a:xfrm>
         </p:spPr>
         <p:txBody>
           <a:bodyPr>
-            <a:normAutofit fontScale="92500" lnSpcReduction="10000"/>
+            <a:normAutofit fontScale="92500" lnSpcReduction="20000"/>
           </a:bodyPr>
           <a:lstStyle/>
           <a:p>
@@ -5865,6 +5884,33 @@
             <a:r>
               <a:rPr lang="en-US" dirty="0"/>
               <a:t> is bad (when they’re in the same parameter set).</a:t>
+            </a:r>
+          </a:p>
+          <a:p>
+            <a:pPr marL="0" indent="0">
+              <a:buNone/>
+            </a:pPr>
+            <a:r>
+              <a:rPr lang="en-US" dirty="0"/>
+              <a:t>Objectives:</a:t>
+            </a:r>
+          </a:p>
+          <a:p>
+            <a:pPr marL="0" indent="0">
+              <a:buNone/>
+            </a:pPr>
+            <a:r>
+              <a:rPr lang="en-US" dirty="0"/>
+              <a:t>	1. Learn how to identify violations.</a:t>
+            </a:r>
+          </a:p>
+          <a:p>
+            <a:pPr marL="0" indent="0">
+              <a:buNone/>
+            </a:pPr>
+            <a:r>
+              <a:rPr lang="en-US" dirty="0"/>
+              <a:t>	2. Learn syntax, etc. for custom PSSA rules.</a:t>
             </a:r>
           </a:p>
           <a:p>

</xml_diff>